<commit_message>
Added a section on overloading
Also updated the top-level readme in lectures to include more entries in the table
</commit_message>
<xml_diff>
--- a/lectures/070_object_oriented_contd/Constructors-ToString.pptx
+++ b/lectures/070_object_oriented_contd/Constructors-ToString.pptx
@@ -3136,7 +3136,7 @@
           <a:p>
             <a:fld id="{2507D560-C4D4-4804-8CBF-2C56AB6C6DB9}" type="datetimeFigureOut">
               <a:rPr lang="en-US" smtClean="0"/>
-              <a:t>5/26/2021</a:t>
+              <a:t>5/28/2021</a:t>
             </a:fld>
             <a:endParaRPr lang="en-US"/>
           </a:p>
@@ -3301,7 +3301,7 @@
           <a:p>
             <a:fld id="{688E7586-9A7B-41FF-B169-85DADA744493}" type="datetimeFigureOut">
               <a:rPr lang="en-US" smtClean="0"/>
-              <a:t>5/26/2021</a:t>
+              <a:t>5/28/2021</a:t>
             </a:fld>
             <a:endParaRPr lang="en-US"/>
           </a:p>
@@ -13177,7 +13177,7 @@
               </a:lnSpc>
             </a:pPr>
             <a:r>
-              <a:rPr lang="en-US" dirty="0">
+              <a:rPr lang="en-US" dirty="0" smtClean="0">
                 <a:solidFill>
                   <a:schemeClr val="tx1"/>
                 </a:solidFill>
@@ -13185,7 +13185,7 @@
               <a:t>  </a:t>
             </a:r>
             <a:r>
-              <a:rPr lang="en-US" dirty="0" err="1">
+              <a:rPr lang="en-US" dirty="0" err="1" smtClean="0">
                 <a:solidFill>
                   <a:srgbClr val="66FFCC"/>
                 </a:solidFill>
@@ -13193,7 +13193,7 @@
               <a:t>ClassRoom</a:t>
             </a:r>
             <a:r>
-              <a:rPr lang="en-US" dirty="0">
+              <a:rPr lang="en-US" dirty="0" smtClean="0">
                 <a:solidFill>
                   <a:schemeClr val="tx1"/>
                 </a:solidFill>
@@ -13201,7 +13201,7 @@
               <a:t> </a:t>
             </a:r>
             <a:r>
-              <a:rPr lang="en-US" dirty="0" err="1">
+              <a:rPr lang="en-US" dirty="0" err="1" smtClean="0">
                 <a:solidFill>
                   <a:schemeClr val="tx1"/>
                 </a:solidFill>
@@ -13209,7 +13209,7 @@
               <a:t>english</a:t>
             </a:r>
             <a:r>
-              <a:rPr lang="en-US" dirty="0">
+              <a:rPr lang="en-US" dirty="0" smtClean="0">
                 <a:solidFill>
                   <a:schemeClr val="tx1"/>
                 </a:solidFill>
@@ -13217,11 +13217,11 @@
               <a:t> = </a:t>
             </a:r>
             <a:r>
-              <a:rPr lang="en-US" dirty="0"/>
+              <a:rPr lang="en-US" dirty="0" smtClean="0"/>
               <a:t>new</a:t>
             </a:r>
             <a:r>
-              <a:rPr lang="en-US" dirty="0">
+              <a:rPr lang="en-US" dirty="0" smtClean="0">
                 <a:solidFill>
                   <a:schemeClr val="tx1"/>
                 </a:solidFill>
@@ -13229,7 +13229,7 @@
               <a:t> </a:t>
             </a:r>
             <a:r>
-              <a:rPr lang="en-US" dirty="0" err="1">
+              <a:rPr lang="en-US" dirty="0" err="1" smtClean="0">
                 <a:solidFill>
                   <a:srgbClr val="66FFCC"/>
                 </a:solidFill>
@@ -13237,7 +13237,7 @@
               <a:t>ClassRoom</a:t>
             </a:r>
             <a:r>
-              <a:rPr lang="en-US" dirty="0">
+              <a:rPr lang="en-US" dirty="0" smtClean="0">
                 <a:solidFill>
                   <a:schemeClr val="tx1"/>
                 </a:solidFill>
@@ -13252,7 +13252,7 @@
               </a:lnSpc>
             </a:pPr>
             <a:r>
-              <a:rPr lang="en-US" dirty="0">
+              <a:rPr lang="en-US" dirty="0" smtClean="0">
                 <a:solidFill>
                   <a:schemeClr val="tx1"/>
                 </a:solidFill>
@@ -13260,7 +13260,7 @@
               <a:t>  </a:t>
             </a:r>
             <a:r>
-              <a:rPr lang="en-US" dirty="0">
+              <a:rPr lang="en-US" dirty="0" smtClean="0">
                 <a:solidFill>
                   <a:srgbClr val="92D050"/>
                 </a:solidFill>
@@ -13268,7 +13268,7 @@
               <a:t>//</a:t>
             </a:r>
             <a:r>
-              <a:rPr lang="en-US" dirty="0" err="1">
+              <a:rPr lang="en-US" dirty="0" err="1" smtClean="0">
                 <a:solidFill>
                   <a:srgbClr val="92D050"/>
                 </a:solidFill>
@@ -13276,7 +13276,7 @@
               <a:t>english</a:t>
             </a:r>
             <a:r>
-              <a:rPr lang="en-US" dirty="0">
+              <a:rPr lang="en-US" dirty="0" smtClean="0">
                 <a:solidFill>
                   <a:srgbClr val="92D050"/>
                 </a:solidFill>
@@ -13291,13 +13291,18 @@
               </a:lnSpc>
             </a:pPr>
             <a:r>
-              <a:rPr lang="en-US" dirty="0">
+              <a:rPr lang="en-US" dirty="0" smtClean="0">
                 <a:solidFill>
                   <a:schemeClr val="tx1"/>
                 </a:solidFill>
               </a:rPr>
               <a:t>}</a:t>
             </a:r>
+            <a:endParaRPr lang="en-US" dirty="0">
+              <a:solidFill>
+                <a:schemeClr val="tx1"/>
+              </a:solidFill>
+            </a:endParaRPr>
           </a:p>
         </p:txBody>
       </p:sp>

</xml_diff>